<commit_message>
progressed workshop 10 and 11 lab exercises answers
</commit_message>
<xml_diff>
--- a/workshop/ws-10-11-lab-answers/diagrams.pptx
+++ b/workshop/ws-10-11-lab-answers/diagrams.pptx
@@ -8,6 +8,7 @@
     <p:sldId id="256" r:id="rId2"/>
     <p:sldId id="257" r:id="rId3"/>
     <p:sldId id="258" r:id="rId4"/>
+    <p:sldId id="259" r:id="rId5"/>
   </p:sldIdLst>
   <p:sldSz cx="9144000" cy="6858000" type="screen4x3"/>
   <p:notesSz cx="6858000" cy="9144000"/>
@@ -6109,11 +6110,6 @@
               </a:rPr>
               <a:t>Source Port</a:t>
             </a:r>
-            <a:endParaRPr lang="en-AU" sz="1200" dirty="0" smtClean="0">
-              <a:solidFill>
-                <a:sysClr val="windowText" lastClr="000000"/>
-              </a:solidFill>
-            </a:endParaRPr>
           </a:p>
           <a:p>
             <a:pPr algn="ctr"/>
@@ -6183,11 +6179,6 @@
               </a:rPr>
               <a:t>Destination Port</a:t>
             </a:r>
-            <a:endParaRPr lang="en-AU" sz="1200" dirty="0" smtClean="0">
-              <a:solidFill>
-                <a:sysClr val="windowText" lastClr="000000"/>
-              </a:solidFill>
-            </a:endParaRPr>
           </a:p>
           <a:p>
             <a:pPr algn="ctr"/>
@@ -6257,11 +6248,6 @@
               </a:rPr>
               <a:t>Sequence Number</a:t>
             </a:r>
-            <a:endParaRPr lang="en-AU" sz="1200" dirty="0" smtClean="0">
-              <a:solidFill>
-                <a:sysClr val="windowText" lastClr="000000"/>
-              </a:solidFill>
-            </a:endParaRPr>
           </a:p>
           <a:p>
             <a:pPr algn="ctr"/>
@@ -6331,11 +6317,6 @@
               </a:rPr>
               <a:t>Acknowledgment Number</a:t>
             </a:r>
-            <a:endParaRPr lang="en-AU" sz="1200" dirty="0" smtClean="0">
-              <a:solidFill>
-                <a:sysClr val="windowText" lastClr="000000"/>
-              </a:solidFill>
-            </a:endParaRPr>
           </a:p>
           <a:p>
             <a:pPr algn="ctr"/>
@@ -6405,11 +6386,6 @@
               </a:rPr>
               <a:t>Header Length | Flags</a:t>
             </a:r>
-            <a:endParaRPr lang="en-AU" sz="1200" spc="-100" dirty="0" smtClean="0">
-              <a:solidFill>
-                <a:sysClr val="windowText" lastClr="000000"/>
-              </a:solidFill>
-            </a:endParaRPr>
           </a:p>
           <a:p>
             <a:pPr algn="ctr"/>
@@ -6479,11 +6455,6 @@
               </a:rPr>
               <a:t>Window Size</a:t>
             </a:r>
-            <a:endParaRPr lang="en-AU" sz="1200" dirty="0" smtClean="0">
-              <a:solidFill>
-                <a:sysClr val="windowText" lastClr="000000"/>
-              </a:solidFill>
-            </a:endParaRPr>
           </a:p>
           <a:p>
             <a:pPr algn="ctr"/>
@@ -6553,11 +6524,6 @@
               </a:rPr>
               <a:t>Checksum</a:t>
             </a:r>
-            <a:endParaRPr lang="en-AU" sz="1200" dirty="0" smtClean="0">
-              <a:solidFill>
-                <a:sysClr val="windowText" lastClr="000000"/>
-              </a:solidFill>
-            </a:endParaRPr>
           </a:p>
           <a:p>
             <a:pPr algn="ctr"/>
@@ -6627,11 +6593,6 @@
               </a:rPr>
               <a:t>Urgent Pointer</a:t>
             </a:r>
-            <a:endParaRPr lang="en-AU" sz="1200" dirty="0" smtClean="0">
-              <a:solidFill>
-                <a:sysClr val="windowText" lastClr="000000"/>
-              </a:solidFill>
-            </a:endParaRPr>
           </a:p>
           <a:p>
             <a:pPr algn="ctr"/>
@@ -6701,11 +6662,6 @@
               </a:rPr>
               <a:t>TCP Segment Data</a:t>
             </a:r>
-            <a:endParaRPr lang="en-AU" sz="1200" dirty="0" smtClean="0">
-              <a:solidFill>
-                <a:sysClr val="windowText" lastClr="000000"/>
-              </a:solidFill>
-            </a:endParaRPr>
           </a:p>
           <a:p>
             <a:pPr algn="ctr"/>
@@ -6729,6 +6685,1287 @@
     <p:extLst>
       <p:ext uri="{BB962C8B-B14F-4D97-AF65-F5344CB8AC3E}">
         <p14:creationId xmlns:p14="http://schemas.microsoft.com/office/powerpoint/2010/main" val="1834733961"/>
+      </p:ext>
+    </p:extLst>
+  </p:cSld>
+  <p:clrMapOvr>
+    <a:masterClrMapping/>
+  </p:clrMapOvr>
+</p:sld>
+</file>
+
+<file path=ppt/slides/slide4.xml><?xml version="1.0" encoding="utf-8"?>
+<p:sld xmlns:a="http://schemas.openxmlformats.org/drawingml/2006/main" xmlns:r="http://schemas.openxmlformats.org/officeDocument/2006/relationships" xmlns:p="http://schemas.openxmlformats.org/presentationml/2006/main">
+  <p:cSld>
+    <p:spTree>
+      <p:nvGrpSpPr>
+        <p:cNvPr id="1" name=""/>
+        <p:cNvGrpSpPr/>
+        <p:nvPr/>
+      </p:nvGrpSpPr>
+      <p:grpSpPr>
+        <a:xfrm>
+          <a:off x="0" y="0"/>
+          <a:ext cx="0" cy="0"/>
+          <a:chOff x="0" y="0"/>
+          <a:chExt cx="0" cy="0"/>
+        </a:xfrm>
+      </p:grpSpPr>
+      <p:sp>
+        <p:nvSpPr>
+          <p:cNvPr id="2" name="Rectangle 1"/>
+          <p:cNvSpPr/>
+          <p:nvPr/>
+        </p:nvSpPr>
+        <p:spPr>
+          <a:xfrm>
+            <a:off x="1296000" y="0"/>
+            <a:ext cx="1296000" cy="648000"/>
+          </a:xfrm>
+          <a:prstGeom prst="rect">
+            <a:avLst/>
+          </a:prstGeom>
+          <a:noFill/>
+          <a:ln w="9525">
+            <a:noFill/>
+          </a:ln>
+        </p:spPr>
+        <p:style>
+          <a:lnRef idx="2">
+            <a:schemeClr val="accent1">
+              <a:shade val="50000"/>
+            </a:schemeClr>
+          </a:lnRef>
+          <a:fillRef idx="1">
+            <a:schemeClr val="accent1"/>
+          </a:fillRef>
+          <a:effectRef idx="0">
+            <a:schemeClr val="accent1"/>
+          </a:effectRef>
+          <a:fontRef idx="minor">
+            <a:schemeClr val="lt1"/>
+          </a:fontRef>
+        </p:style>
+        <p:txBody>
+          <a:bodyPr rtlCol="0" anchor="ctr"/>
+          <a:lstStyle/>
+          <a:p>
+            <a:pPr algn="ctr"/>
+            <a:r>
+              <a:rPr lang="en-AU" sz="1200" dirty="0" smtClean="0">
+                <a:solidFill>
+                  <a:sysClr val="windowText" lastClr="000000"/>
+                </a:solidFill>
+              </a:rPr>
+              <a:t>Host</a:t>
+            </a:r>
+          </a:p>
+          <a:p>
+            <a:pPr algn="ctr"/>
+            <a:r>
+              <a:rPr lang="en-AU" sz="1200" i="1" dirty="0">
+                <a:solidFill>
+                  <a:sysClr val="windowText" lastClr="000000"/>
+                </a:solidFill>
+              </a:rPr>
+              <a:t>My </a:t>
+            </a:r>
+            <a:r>
+              <a:rPr lang="en-AU" sz="1200" i="1" dirty="0" smtClean="0">
+                <a:solidFill>
+                  <a:sysClr val="windowText" lastClr="000000"/>
+                </a:solidFill>
+              </a:rPr>
+              <a:t>Computer</a:t>
+            </a:r>
+            <a:endParaRPr lang="en-AU" sz="1200" i="1" dirty="0" smtClean="0">
+              <a:solidFill>
+                <a:sysClr val="windowText" lastClr="000000"/>
+              </a:solidFill>
+            </a:endParaRPr>
+          </a:p>
+          <a:p>
+            <a:pPr algn="ctr"/>
+            <a:r>
+              <a:rPr lang="en-AU" sz="1200" dirty="0" smtClean="0">
+                <a:solidFill>
+                  <a:sysClr val="windowText" lastClr="000000"/>
+                </a:solidFill>
+              </a:rPr>
+              <a:t>10.96.200.173</a:t>
+            </a:r>
+            <a:endParaRPr lang="en-AU" sz="1200" dirty="0">
+              <a:solidFill>
+                <a:sysClr val="windowText" lastClr="000000"/>
+              </a:solidFill>
+            </a:endParaRPr>
+          </a:p>
+        </p:txBody>
+      </p:sp>
+      <p:sp>
+        <p:nvSpPr>
+          <p:cNvPr id="3" name="Rectangle 2"/>
+          <p:cNvSpPr/>
+          <p:nvPr/>
+        </p:nvSpPr>
+        <p:spPr>
+          <a:xfrm>
+            <a:off x="5184000" y="0"/>
+            <a:ext cx="1296000" cy="648000"/>
+          </a:xfrm>
+          <a:prstGeom prst="rect">
+            <a:avLst/>
+          </a:prstGeom>
+          <a:noFill/>
+          <a:ln w="9525">
+            <a:noFill/>
+          </a:ln>
+        </p:spPr>
+        <p:style>
+          <a:lnRef idx="2">
+            <a:schemeClr val="accent1">
+              <a:shade val="50000"/>
+            </a:schemeClr>
+          </a:lnRef>
+          <a:fillRef idx="1">
+            <a:schemeClr val="accent1"/>
+          </a:fillRef>
+          <a:effectRef idx="0">
+            <a:schemeClr val="accent1"/>
+          </a:effectRef>
+          <a:fontRef idx="minor">
+            <a:schemeClr val="lt1"/>
+          </a:fontRef>
+        </p:style>
+        <p:txBody>
+          <a:bodyPr rtlCol="0" anchor="ctr"/>
+          <a:lstStyle/>
+          <a:p>
+            <a:pPr algn="ctr"/>
+            <a:r>
+              <a:rPr lang="en-AU" sz="1200" dirty="0" smtClean="0">
+                <a:solidFill>
+                  <a:sysClr val="windowText" lastClr="000000"/>
+                </a:solidFill>
+              </a:rPr>
+              <a:t>Host</a:t>
+            </a:r>
+          </a:p>
+          <a:p>
+            <a:pPr algn="ctr"/>
+            <a:r>
+              <a:rPr lang="en-AU" sz="1200" i="1" dirty="0" smtClean="0">
+                <a:solidFill>
+                  <a:sysClr val="windowText" lastClr="000000"/>
+                </a:solidFill>
+              </a:rPr>
+              <a:t>Remote Server</a:t>
+            </a:r>
+            <a:endParaRPr lang="en-AU" sz="1200" i="1" dirty="0" smtClean="0">
+              <a:solidFill>
+                <a:sysClr val="windowText" lastClr="000000"/>
+              </a:solidFill>
+            </a:endParaRPr>
+          </a:p>
+          <a:p>
+            <a:pPr algn="ctr"/>
+            <a:r>
+              <a:rPr lang="en-AU" sz="1200" dirty="0" smtClean="0">
+                <a:solidFill>
+                  <a:sysClr val="windowText" lastClr="000000"/>
+                </a:solidFill>
+              </a:rPr>
+              <a:t>www.google.com</a:t>
+            </a:r>
+            <a:endParaRPr lang="en-AU" sz="1200" dirty="0">
+              <a:solidFill>
+                <a:sysClr val="windowText" lastClr="000000"/>
+              </a:solidFill>
+            </a:endParaRPr>
+          </a:p>
+        </p:txBody>
+      </p:sp>
+      <p:cxnSp>
+        <p:nvCxnSpPr>
+          <p:cNvPr id="5" name="Straight Connector 4"/>
+          <p:cNvCxnSpPr/>
+          <p:nvPr/>
+        </p:nvCxnSpPr>
+        <p:spPr>
+          <a:xfrm>
+            <a:off x="1944000" y="648000"/>
+            <a:ext cx="0" cy="3024000"/>
+          </a:xfrm>
+          <a:prstGeom prst="line">
+            <a:avLst/>
+          </a:prstGeom>
+          <a:ln>
+            <a:solidFill>
+              <a:schemeClr val="tx1"/>
+            </a:solidFill>
+            <a:headEnd type="none" w="med" len="med"/>
+            <a:tailEnd type="triangle" w="med" len="med"/>
+          </a:ln>
+        </p:spPr>
+        <p:style>
+          <a:lnRef idx="1">
+            <a:schemeClr val="accent1"/>
+          </a:lnRef>
+          <a:fillRef idx="0">
+            <a:schemeClr val="accent1"/>
+          </a:fillRef>
+          <a:effectRef idx="0">
+            <a:schemeClr val="accent1"/>
+          </a:effectRef>
+          <a:fontRef idx="minor">
+            <a:schemeClr val="tx1"/>
+          </a:fontRef>
+        </p:style>
+      </p:cxnSp>
+      <p:cxnSp>
+        <p:nvCxnSpPr>
+          <p:cNvPr id="6" name="Straight Connector 5"/>
+          <p:cNvCxnSpPr/>
+          <p:nvPr/>
+        </p:nvCxnSpPr>
+        <p:spPr>
+          <a:xfrm>
+            <a:off x="5832000" y="648000"/>
+            <a:ext cx="0" cy="3024000"/>
+          </a:xfrm>
+          <a:prstGeom prst="line">
+            <a:avLst/>
+          </a:prstGeom>
+          <a:ln>
+            <a:solidFill>
+              <a:schemeClr val="tx1"/>
+            </a:solidFill>
+            <a:headEnd type="none" w="med" len="med"/>
+            <a:tailEnd type="triangle" w="med" len="med"/>
+          </a:ln>
+        </p:spPr>
+        <p:style>
+          <a:lnRef idx="1">
+            <a:schemeClr val="accent1"/>
+          </a:lnRef>
+          <a:fillRef idx="0">
+            <a:schemeClr val="accent1"/>
+          </a:fillRef>
+          <a:effectRef idx="0">
+            <a:schemeClr val="accent1"/>
+          </a:effectRef>
+          <a:fontRef idx="minor">
+            <a:schemeClr val="tx1"/>
+          </a:fontRef>
+        </p:style>
+      </p:cxnSp>
+      <p:cxnSp>
+        <p:nvCxnSpPr>
+          <p:cNvPr id="9" name="Straight Arrow Connector 8"/>
+          <p:cNvCxnSpPr/>
+          <p:nvPr/>
+        </p:nvCxnSpPr>
+        <p:spPr>
+          <a:xfrm>
+            <a:off x="1944000" y="864000"/>
+            <a:ext cx="3888000" cy="432000"/>
+          </a:xfrm>
+          <a:prstGeom prst="straightConnector1">
+            <a:avLst/>
+          </a:prstGeom>
+          <a:ln>
+            <a:solidFill>
+              <a:schemeClr val="tx1"/>
+            </a:solidFill>
+            <a:tailEnd type="arrow"/>
+          </a:ln>
+        </p:spPr>
+        <p:style>
+          <a:lnRef idx="1">
+            <a:schemeClr val="accent1"/>
+          </a:lnRef>
+          <a:fillRef idx="0">
+            <a:schemeClr val="accent1"/>
+          </a:fillRef>
+          <a:effectRef idx="0">
+            <a:schemeClr val="accent1"/>
+          </a:effectRef>
+          <a:fontRef idx="minor">
+            <a:schemeClr val="tx1"/>
+          </a:fontRef>
+        </p:style>
+      </p:cxnSp>
+      <p:sp>
+        <p:nvSpPr>
+          <p:cNvPr id="12" name="Rectangle 11"/>
+          <p:cNvSpPr/>
+          <p:nvPr/>
+        </p:nvSpPr>
+        <p:spPr>
+          <a:xfrm>
+            <a:off x="3240000" y="792000"/>
+            <a:ext cx="1296000" cy="216000"/>
+          </a:xfrm>
+          <a:prstGeom prst="rect">
+            <a:avLst/>
+          </a:prstGeom>
+          <a:noFill/>
+          <a:ln w="9525">
+            <a:noFill/>
+          </a:ln>
+        </p:spPr>
+        <p:style>
+          <a:lnRef idx="2">
+            <a:schemeClr val="accent1">
+              <a:shade val="50000"/>
+            </a:schemeClr>
+          </a:lnRef>
+          <a:fillRef idx="1">
+            <a:schemeClr val="accent1"/>
+          </a:fillRef>
+          <a:effectRef idx="0">
+            <a:schemeClr val="accent1"/>
+          </a:effectRef>
+          <a:fontRef idx="minor">
+            <a:schemeClr val="lt1"/>
+          </a:fontRef>
+        </p:style>
+        <p:txBody>
+          <a:bodyPr rtlCol="0" anchor="ctr"/>
+          <a:lstStyle/>
+          <a:p>
+            <a:pPr algn="ctr"/>
+            <a:r>
+              <a:rPr lang="en-AU" sz="1200" dirty="0" smtClean="0">
+                <a:solidFill>
+                  <a:sysClr val="windowText" lastClr="000000"/>
+                </a:solidFill>
+              </a:rPr>
+              <a:t>SYN (</a:t>
+            </a:r>
+            <a:r>
+              <a:rPr lang="en-AU" sz="1200" dirty="0" err="1" smtClean="0">
+                <a:solidFill>
+                  <a:sysClr val="windowText" lastClr="000000"/>
+                </a:solidFill>
+              </a:rPr>
+              <a:t>Seq</a:t>
+            </a:r>
+            <a:r>
+              <a:rPr lang="en-AU" sz="1200" dirty="0" smtClean="0">
+                <a:solidFill>
+                  <a:sysClr val="windowText" lastClr="000000"/>
+                </a:solidFill>
+              </a:rPr>
+              <a:t>=0)</a:t>
+            </a:r>
+            <a:endParaRPr lang="en-AU" sz="1200" dirty="0">
+              <a:solidFill>
+                <a:sysClr val="windowText" lastClr="000000"/>
+              </a:solidFill>
+            </a:endParaRPr>
+          </a:p>
+        </p:txBody>
+      </p:sp>
+      <p:cxnSp>
+        <p:nvCxnSpPr>
+          <p:cNvPr id="13" name="Straight Arrow Connector 12"/>
+          <p:cNvCxnSpPr/>
+          <p:nvPr/>
+        </p:nvCxnSpPr>
+        <p:spPr>
+          <a:xfrm flipV="1">
+            <a:off x="1944000" y="1512000"/>
+            <a:ext cx="3888000" cy="432000"/>
+          </a:xfrm>
+          <a:prstGeom prst="straightConnector1">
+            <a:avLst/>
+          </a:prstGeom>
+          <a:ln>
+            <a:solidFill>
+              <a:schemeClr val="tx1"/>
+            </a:solidFill>
+            <a:headEnd type="arrow" w="med" len="med"/>
+            <a:tailEnd type="none" w="med" len="med"/>
+          </a:ln>
+        </p:spPr>
+        <p:style>
+          <a:lnRef idx="1">
+            <a:schemeClr val="accent1"/>
+          </a:lnRef>
+          <a:fillRef idx="0">
+            <a:schemeClr val="accent1"/>
+          </a:fillRef>
+          <a:effectRef idx="0">
+            <a:schemeClr val="accent1"/>
+          </a:effectRef>
+          <a:fontRef idx="minor">
+            <a:schemeClr val="tx1"/>
+          </a:fontRef>
+        </p:style>
+      </p:cxnSp>
+      <p:sp>
+        <p:nvSpPr>
+          <p:cNvPr id="15" name="Rectangle 14"/>
+          <p:cNvSpPr/>
+          <p:nvPr/>
+        </p:nvSpPr>
+        <p:spPr>
+          <a:xfrm>
+            <a:off x="2592000" y="1440000"/>
+            <a:ext cx="2592000" cy="216000"/>
+          </a:xfrm>
+          <a:prstGeom prst="rect">
+            <a:avLst/>
+          </a:prstGeom>
+          <a:noFill/>
+          <a:ln w="9525">
+            <a:noFill/>
+          </a:ln>
+        </p:spPr>
+        <p:style>
+          <a:lnRef idx="2">
+            <a:schemeClr val="accent1">
+              <a:shade val="50000"/>
+            </a:schemeClr>
+          </a:lnRef>
+          <a:fillRef idx="1">
+            <a:schemeClr val="accent1"/>
+          </a:fillRef>
+          <a:effectRef idx="0">
+            <a:schemeClr val="accent1"/>
+          </a:effectRef>
+          <a:fontRef idx="minor">
+            <a:schemeClr val="lt1"/>
+          </a:fontRef>
+        </p:style>
+        <p:txBody>
+          <a:bodyPr rtlCol="0" anchor="ctr"/>
+          <a:lstStyle/>
+          <a:p>
+            <a:pPr algn="ctr"/>
+            <a:r>
+              <a:rPr lang="en-AU" sz="1200" dirty="0" smtClean="0">
+                <a:solidFill>
+                  <a:sysClr val="windowText" lastClr="000000"/>
+                </a:solidFill>
+              </a:rPr>
+              <a:t>SYN</a:t>
+            </a:r>
+            <a:r>
+              <a:rPr lang="en-AU" sz="1200" dirty="0">
+                <a:solidFill>
+                  <a:sysClr val="windowText" lastClr="000000"/>
+                </a:solidFill>
+              </a:rPr>
+              <a:t>, ACK (</a:t>
+            </a:r>
+            <a:r>
+              <a:rPr lang="en-AU" sz="1200" dirty="0" err="1" smtClean="0">
+                <a:solidFill>
+                  <a:sysClr val="windowText" lastClr="000000"/>
+                </a:solidFill>
+              </a:rPr>
+              <a:t>Seq</a:t>
+            </a:r>
+            <a:r>
+              <a:rPr lang="en-AU" sz="1200" dirty="0" smtClean="0">
+                <a:solidFill>
+                  <a:sysClr val="windowText" lastClr="000000"/>
+                </a:solidFill>
+              </a:rPr>
+              <a:t>=0, </a:t>
+            </a:r>
+            <a:r>
+              <a:rPr lang="en-AU" sz="1200" dirty="0" err="1" smtClean="0">
+                <a:solidFill>
+                  <a:sysClr val="windowText" lastClr="000000"/>
+                </a:solidFill>
+              </a:rPr>
+              <a:t>Ack</a:t>
+            </a:r>
+            <a:r>
+              <a:rPr lang="en-AU" sz="1200" dirty="0" smtClean="0">
+                <a:solidFill>
+                  <a:sysClr val="windowText" lastClr="000000"/>
+                </a:solidFill>
+              </a:rPr>
+              <a:t>=1)</a:t>
+            </a:r>
+            <a:endParaRPr lang="en-AU" sz="1200" dirty="0">
+              <a:solidFill>
+                <a:sysClr val="windowText" lastClr="000000"/>
+              </a:solidFill>
+            </a:endParaRPr>
+          </a:p>
+        </p:txBody>
+      </p:sp>
+      <p:cxnSp>
+        <p:nvCxnSpPr>
+          <p:cNvPr id="16" name="Straight Arrow Connector 15"/>
+          <p:cNvCxnSpPr/>
+          <p:nvPr/>
+        </p:nvCxnSpPr>
+        <p:spPr>
+          <a:xfrm>
+            <a:off x="1944000" y="2160000"/>
+            <a:ext cx="3888000" cy="432000"/>
+          </a:xfrm>
+          <a:prstGeom prst="straightConnector1">
+            <a:avLst/>
+          </a:prstGeom>
+          <a:ln>
+            <a:solidFill>
+              <a:schemeClr val="tx1"/>
+            </a:solidFill>
+            <a:tailEnd type="arrow"/>
+          </a:ln>
+        </p:spPr>
+        <p:style>
+          <a:lnRef idx="1">
+            <a:schemeClr val="accent1"/>
+          </a:lnRef>
+          <a:fillRef idx="0">
+            <a:schemeClr val="accent1"/>
+          </a:fillRef>
+          <a:effectRef idx="0">
+            <a:schemeClr val="accent1"/>
+          </a:effectRef>
+          <a:fontRef idx="minor">
+            <a:schemeClr val="tx1"/>
+          </a:fontRef>
+        </p:style>
+      </p:cxnSp>
+      <p:sp>
+        <p:nvSpPr>
+          <p:cNvPr id="17" name="Rectangle 16"/>
+          <p:cNvSpPr/>
+          <p:nvPr/>
+        </p:nvSpPr>
+        <p:spPr>
+          <a:xfrm>
+            <a:off x="2592000" y="2088000"/>
+            <a:ext cx="2592000" cy="216000"/>
+          </a:xfrm>
+          <a:prstGeom prst="rect">
+            <a:avLst/>
+          </a:prstGeom>
+          <a:noFill/>
+          <a:ln w="9525">
+            <a:noFill/>
+          </a:ln>
+        </p:spPr>
+        <p:style>
+          <a:lnRef idx="2">
+            <a:schemeClr val="accent1">
+              <a:shade val="50000"/>
+            </a:schemeClr>
+          </a:lnRef>
+          <a:fillRef idx="1">
+            <a:schemeClr val="accent1"/>
+          </a:fillRef>
+          <a:effectRef idx="0">
+            <a:schemeClr val="accent1"/>
+          </a:effectRef>
+          <a:fontRef idx="minor">
+            <a:schemeClr val="lt1"/>
+          </a:fontRef>
+        </p:style>
+        <p:txBody>
+          <a:bodyPr rtlCol="0" anchor="ctr"/>
+          <a:lstStyle/>
+          <a:p>
+            <a:pPr algn="ctr"/>
+            <a:r>
+              <a:rPr lang="en-AU" sz="1200" dirty="0" smtClean="0">
+                <a:solidFill>
+                  <a:sysClr val="windowText" lastClr="000000"/>
+                </a:solidFill>
+              </a:rPr>
+              <a:t>ACK (</a:t>
+            </a:r>
+            <a:r>
+              <a:rPr lang="en-AU" sz="1200" dirty="0" err="1" smtClean="0">
+                <a:solidFill>
+                  <a:sysClr val="windowText" lastClr="000000"/>
+                </a:solidFill>
+              </a:rPr>
+              <a:t>Seq</a:t>
+            </a:r>
+            <a:r>
+              <a:rPr lang="en-AU" sz="1200" dirty="0" smtClean="0">
+                <a:solidFill>
+                  <a:sysClr val="windowText" lastClr="000000"/>
+                </a:solidFill>
+              </a:rPr>
+              <a:t>=1, </a:t>
+            </a:r>
+            <a:r>
+              <a:rPr lang="en-AU" sz="1200" dirty="0" err="1" smtClean="0">
+                <a:solidFill>
+                  <a:sysClr val="windowText" lastClr="000000"/>
+                </a:solidFill>
+              </a:rPr>
+              <a:t>Ack</a:t>
+            </a:r>
+            <a:r>
+              <a:rPr lang="en-AU" sz="1200" dirty="0" smtClean="0">
+                <a:solidFill>
+                  <a:sysClr val="windowText" lastClr="000000"/>
+                </a:solidFill>
+              </a:rPr>
+              <a:t>=1)</a:t>
+            </a:r>
+            <a:endParaRPr lang="en-AU" sz="1200" dirty="0">
+              <a:solidFill>
+                <a:sysClr val="windowText" lastClr="000000"/>
+              </a:solidFill>
+            </a:endParaRPr>
+          </a:p>
+        </p:txBody>
+      </p:sp>
+      <p:cxnSp>
+        <p:nvCxnSpPr>
+          <p:cNvPr id="18" name="Straight Arrow Connector 17"/>
+          <p:cNvCxnSpPr/>
+          <p:nvPr/>
+        </p:nvCxnSpPr>
+        <p:spPr>
+          <a:xfrm>
+            <a:off x="1944000" y="2808000"/>
+            <a:ext cx="3888000" cy="432000"/>
+          </a:xfrm>
+          <a:prstGeom prst="straightConnector1">
+            <a:avLst/>
+          </a:prstGeom>
+          <a:ln>
+            <a:solidFill>
+              <a:schemeClr val="tx1"/>
+            </a:solidFill>
+            <a:tailEnd type="arrow"/>
+          </a:ln>
+        </p:spPr>
+        <p:style>
+          <a:lnRef idx="1">
+            <a:schemeClr val="accent1"/>
+          </a:lnRef>
+          <a:fillRef idx="0">
+            <a:schemeClr val="accent1"/>
+          </a:fillRef>
+          <a:effectRef idx="0">
+            <a:schemeClr val="accent1"/>
+          </a:effectRef>
+          <a:fontRef idx="minor">
+            <a:schemeClr val="tx1"/>
+          </a:fontRef>
+        </p:style>
+      </p:cxnSp>
+      <p:sp>
+        <p:nvSpPr>
+          <p:cNvPr id="20" name="Rectangle 19"/>
+          <p:cNvSpPr/>
+          <p:nvPr/>
+        </p:nvSpPr>
+        <p:spPr>
+          <a:xfrm>
+            <a:off x="2268000" y="2664000"/>
+            <a:ext cx="3240000" cy="216000"/>
+          </a:xfrm>
+          <a:prstGeom prst="rect">
+            <a:avLst/>
+          </a:prstGeom>
+          <a:noFill/>
+          <a:ln w="9525">
+            <a:noFill/>
+          </a:ln>
+        </p:spPr>
+        <p:style>
+          <a:lnRef idx="2">
+            <a:schemeClr val="accent1">
+              <a:shade val="50000"/>
+            </a:schemeClr>
+          </a:lnRef>
+          <a:fillRef idx="1">
+            <a:schemeClr val="accent1"/>
+          </a:fillRef>
+          <a:effectRef idx="0">
+            <a:schemeClr val="accent1"/>
+          </a:effectRef>
+          <a:fontRef idx="minor">
+            <a:schemeClr val="lt1"/>
+          </a:fontRef>
+        </p:style>
+        <p:txBody>
+          <a:bodyPr rtlCol="0" anchor="ctr"/>
+          <a:lstStyle/>
+          <a:p>
+            <a:pPr algn="ctr"/>
+            <a:r>
+              <a:rPr lang="en-AU" sz="1200" dirty="0" smtClean="0">
+                <a:solidFill>
+                  <a:sysClr val="windowText" lastClr="000000"/>
+                </a:solidFill>
+              </a:rPr>
+              <a:t>Data as </a:t>
+            </a:r>
+            <a:r>
+              <a:rPr lang="en-AU" sz="1200" i="1" dirty="0" smtClean="0">
+                <a:solidFill>
+                  <a:sysClr val="windowText" lastClr="000000"/>
+                </a:solidFill>
+              </a:rPr>
+              <a:t>HTTP GET Request</a:t>
+            </a:r>
+            <a:r>
+              <a:rPr lang="en-AU" sz="1200" dirty="0" smtClean="0">
+                <a:solidFill>
+                  <a:sysClr val="windowText" lastClr="000000"/>
+                </a:solidFill>
+              </a:rPr>
+              <a:t> (</a:t>
+            </a:r>
+            <a:r>
+              <a:rPr lang="en-AU" sz="1200" dirty="0" err="1" smtClean="0">
+                <a:solidFill>
+                  <a:sysClr val="windowText" lastClr="000000"/>
+                </a:solidFill>
+              </a:rPr>
+              <a:t>Seq</a:t>
+            </a:r>
+            <a:r>
+              <a:rPr lang="en-AU" sz="1200" dirty="0" smtClean="0">
+                <a:solidFill>
+                  <a:sysClr val="windowText" lastClr="000000"/>
+                </a:solidFill>
+              </a:rPr>
+              <a:t>=1, </a:t>
+            </a:r>
+            <a:r>
+              <a:rPr lang="en-AU" sz="1200" dirty="0" err="1" smtClean="0">
+                <a:solidFill>
+                  <a:sysClr val="windowText" lastClr="000000"/>
+                </a:solidFill>
+              </a:rPr>
+              <a:t>Ack</a:t>
+            </a:r>
+            <a:r>
+              <a:rPr lang="en-AU" sz="1200" dirty="0" smtClean="0">
+                <a:solidFill>
+                  <a:sysClr val="windowText" lastClr="000000"/>
+                </a:solidFill>
+              </a:rPr>
+              <a:t>=1)</a:t>
+            </a:r>
+            <a:endParaRPr lang="en-AU" sz="1200" dirty="0">
+              <a:solidFill>
+                <a:sysClr val="windowText" lastClr="000000"/>
+              </a:solidFill>
+            </a:endParaRPr>
+          </a:p>
+        </p:txBody>
+      </p:sp>
+      <p:sp>
+        <p:nvSpPr>
+          <p:cNvPr id="22" name="Rectangle 21"/>
+          <p:cNvSpPr/>
+          <p:nvPr/>
+        </p:nvSpPr>
+        <p:spPr>
+          <a:xfrm>
+            <a:off x="1368000" y="756000"/>
+            <a:ext cx="540000" cy="216000"/>
+          </a:xfrm>
+          <a:prstGeom prst="rect">
+            <a:avLst/>
+          </a:prstGeom>
+          <a:noFill/>
+          <a:ln w="9525">
+            <a:noFill/>
+          </a:ln>
+        </p:spPr>
+        <p:style>
+          <a:lnRef idx="2">
+            <a:schemeClr val="accent1">
+              <a:shade val="50000"/>
+            </a:schemeClr>
+          </a:lnRef>
+          <a:fillRef idx="1">
+            <a:schemeClr val="accent1"/>
+          </a:fillRef>
+          <a:effectRef idx="0">
+            <a:schemeClr val="accent1"/>
+          </a:effectRef>
+          <a:fontRef idx="minor">
+            <a:schemeClr val="lt1"/>
+          </a:fontRef>
+        </p:style>
+        <p:txBody>
+          <a:bodyPr rtlCol="0" anchor="ctr"/>
+          <a:lstStyle/>
+          <a:p>
+            <a:pPr algn="r"/>
+            <a:r>
+              <a:rPr lang="en-AU" sz="1200" dirty="0" smtClean="0">
+                <a:solidFill>
+                  <a:sysClr val="windowText" lastClr="000000"/>
+                </a:solidFill>
+              </a:rPr>
+              <a:t>0 </a:t>
+            </a:r>
+            <a:r>
+              <a:rPr lang="en-AU" sz="1200" dirty="0" err="1" smtClean="0">
+                <a:solidFill>
+                  <a:sysClr val="windowText" lastClr="000000"/>
+                </a:solidFill>
+              </a:rPr>
+              <a:t>ms</a:t>
+            </a:r>
+            <a:endParaRPr lang="en-AU" sz="1200" dirty="0">
+              <a:solidFill>
+                <a:sysClr val="windowText" lastClr="000000"/>
+              </a:solidFill>
+            </a:endParaRPr>
+          </a:p>
+        </p:txBody>
+      </p:sp>
+      <p:cxnSp>
+        <p:nvCxnSpPr>
+          <p:cNvPr id="24" name="Straight Connector 23"/>
+          <p:cNvCxnSpPr/>
+          <p:nvPr/>
+        </p:nvCxnSpPr>
+        <p:spPr>
+          <a:xfrm>
+            <a:off x="1908000" y="864000"/>
+            <a:ext cx="36000" cy="0"/>
+          </a:xfrm>
+          <a:prstGeom prst="line">
+            <a:avLst/>
+          </a:prstGeom>
+          <a:ln>
+            <a:solidFill>
+              <a:schemeClr val="tx1"/>
+            </a:solidFill>
+          </a:ln>
+        </p:spPr>
+        <p:style>
+          <a:lnRef idx="1">
+            <a:schemeClr val="accent1"/>
+          </a:lnRef>
+          <a:fillRef idx="0">
+            <a:schemeClr val="accent1"/>
+          </a:fillRef>
+          <a:effectRef idx="0">
+            <a:schemeClr val="accent1"/>
+          </a:effectRef>
+          <a:fontRef idx="minor">
+            <a:schemeClr val="tx1"/>
+          </a:fontRef>
+        </p:style>
+      </p:cxnSp>
+      <p:sp>
+        <p:nvSpPr>
+          <p:cNvPr id="25" name="Rectangle 24"/>
+          <p:cNvSpPr/>
+          <p:nvPr/>
+        </p:nvSpPr>
+        <p:spPr>
+          <a:xfrm>
+            <a:off x="1368000" y="1836000"/>
+            <a:ext cx="540000" cy="216000"/>
+          </a:xfrm>
+          <a:prstGeom prst="rect">
+            <a:avLst/>
+          </a:prstGeom>
+          <a:noFill/>
+          <a:ln w="9525">
+            <a:noFill/>
+          </a:ln>
+        </p:spPr>
+        <p:style>
+          <a:lnRef idx="2">
+            <a:schemeClr val="accent1">
+              <a:shade val="50000"/>
+            </a:schemeClr>
+          </a:lnRef>
+          <a:fillRef idx="1">
+            <a:schemeClr val="accent1"/>
+          </a:fillRef>
+          <a:effectRef idx="0">
+            <a:schemeClr val="accent1"/>
+          </a:effectRef>
+          <a:fontRef idx="minor">
+            <a:schemeClr val="lt1"/>
+          </a:fontRef>
+        </p:style>
+        <p:txBody>
+          <a:bodyPr rtlCol="0" anchor="ctr"/>
+          <a:lstStyle/>
+          <a:p>
+            <a:pPr algn="r"/>
+            <a:r>
+              <a:rPr lang="en-AU" sz="1200" dirty="0" smtClean="0">
+                <a:solidFill>
+                  <a:sysClr val="windowText" lastClr="000000"/>
+                </a:solidFill>
+              </a:rPr>
+              <a:t>1.060</a:t>
+            </a:r>
+            <a:endParaRPr lang="en-AU" sz="1200" dirty="0">
+              <a:solidFill>
+                <a:sysClr val="windowText" lastClr="000000"/>
+              </a:solidFill>
+            </a:endParaRPr>
+          </a:p>
+        </p:txBody>
+      </p:sp>
+      <p:cxnSp>
+        <p:nvCxnSpPr>
+          <p:cNvPr id="26" name="Straight Connector 25"/>
+          <p:cNvCxnSpPr/>
+          <p:nvPr/>
+        </p:nvCxnSpPr>
+        <p:spPr>
+          <a:xfrm>
+            <a:off x="1908000" y="1944000"/>
+            <a:ext cx="36000" cy="0"/>
+          </a:xfrm>
+          <a:prstGeom prst="line">
+            <a:avLst/>
+          </a:prstGeom>
+          <a:ln>
+            <a:solidFill>
+              <a:schemeClr val="tx1"/>
+            </a:solidFill>
+          </a:ln>
+        </p:spPr>
+        <p:style>
+          <a:lnRef idx="1">
+            <a:schemeClr val="accent1"/>
+          </a:lnRef>
+          <a:fillRef idx="0">
+            <a:schemeClr val="accent1"/>
+          </a:fillRef>
+          <a:effectRef idx="0">
+            <a:schemeClr val="accent1"/>
+          </a:effectRef>
+          <a:fontRef idx="minor">
+            <a:schemeClr val="tx1"/>
+          </a:fontRef>
+        </p:style>
+      </p:cxnSp>
+      <p:cxnSp>
+        <p:nvCxnSpPr>
+          <p:cNvPr id="27" name="Straight Connector 26"/>
+          <p:cNvCxnSpPr/>
+          <p:nvPr/>
+        </p:nvCxnSpPr>
+        <p:spPr>
+          <a:xfrm>
+            <a:off x="1908000" y="2160000"/>
+            <a:ext cx="36000" cy="0"/>
+          </a:xfrm>
+          <a:prstGeom prst="line">
+            <a:avLst/>
+          </a:prstGeom>
+          <a:ln>
+            <a:solidFill>
+              <a:schemeClr val="tx1"/>
+            </a:solidFill>
+          </a:ln>
+        </p:spPr>
+        <p:style>
+          <a:lnRef idx="1">
+            <a:schemeClr val="accent1"/>
+          </a:lnRef>
+          <a:fillRef idx="0">
+            <a:schemeClr val="accent1"/>
+          </a:fillRef>
+          <a:effectRef idx="0">
+            <a:schemeClr val="accent1"/>
+          </a:effectRef>
+          <a:fontRef idx="minor">
+            <a:schemeClr val="tx1"/>
+          </a:fontRef>
+        </p:style>
+      </p:cxnSp>
+      <p:sp>
+        <p:nvSpPr>
+          <p:cNvPr id="28" name="Rectangle 27"/>
+          <p:cNvSpPr/>
+          <p:nvPr/>
+        </p:nvSpPr>
+        <p:spPr>
+          <a:xfrm>
+            <a:off x="1368000" y="2052000"/>
+            <a:ext cx="540000" cy="216000"/>
+          </a:xfrm>
+          <a:prstGeom prst="rect">
+            <a:avLst/>
+          </a:prstGeom>
+          <a:noFill/>
+          <a:ln w="9525">
+            <a:noFill/>
+          </a:ln>
+        </p:spPr>
+        <p:style>
+          <a:lnRef idx="2">
+            <a:schemeClr val="accent1">
+              <a:shade val="50000"/>
+            </a:schemeClr>
+          </a:lnRef>
+          <a:fillRef idx="1">
+            <a:schemeClr val="accent1"/>
+          </a:fillRef>
+          <a:effectRef idx="0">
+            <a:schemeClr val="accent1"/>
+          </a:effectRef>
+          <a:fontRef idx="minor">
+            <a:schemeClr val="lt1"/>
+          </a:fontRef>
+        </p:style>
+        <p:txBody>
+          <a:bodyPr rtlCol="0" anchor="ctr"/>
+          <a:lstStyle/>
+          <a:p>
+            <a:pPr algn="r"/>
+            <a:r>
+              <a:rPr lang="en-AU" sz="1200" dirty="0" smtClean="0">
+                <a:solidFill>
+                  <a:sysClr val="windowText" lastClr="000000"/>
+                </a:solidFill>
+              </a:rPr>
+              <a:t>1.099</a:t>
+            </a:r>
+            <a:endParaRPr lang="en-AU" sz="1200" dirty="0">
+              <a:solidFill>
+                <a:sysClr val="windowText" lastClr="000000"/>
+              </a:solidFill>
+            </a:endParaRPr>
+          </a:p>
+        </p:txBody>
+      </p:sp>
+      <p:cxnSp>
+        <p:nvCxnSpPr>
+          <p:cNvPr id="29" name="Straight Connector 28"/>
+          <p:cNvCxnSpPr/>
+          <p:nvPr/>
+        </p:nvCxnSpPr>
+        <p:spPr>
+          <a:xfrm>
+            <a:off x="1908000" y="2808000"/>
+            <a:ext cx="36000" cy="0"/>
+          </a:xfrm>
+          <a:prstGeom prst="line">
+            <a:avLst/>
+          </a:prstGeom>
+          <a:ln>
+            <a:solidFill>
+              <a:schemeClr val="tx1"/>
+            </a:solidFill>
+          </a:ln>
+        </p:spPr>
+        <p:style>
+          <a:lnRef idx="1">
+            <a:schemeClr val="accent1"/>
+          </a:lnRef>
+          <a:fillRef idx="0">
+            <a:schemeClr val="accent1"/>
+          </a:fillRef>
+          <a:effectRef idx="0">
+            <a:schemeClr val="accent1"/>
+          </a:effectRef>
+          <a:fontRef idx="minor">
+            <a:schemeClr val="tx1"/>
+          </a:fontRef>
+        </p:style>
+      </p:cxnSp>
+      <p:sp>
+        <p:nvSpPr>
+          <p:cNvPr id="30" name="Rectangle 29"/>
+          <p:cNvSpPr/>
+          <p:nvPr/>
+        </p:nvSpPr>
+        <p:spPr>
+          <a:xfrm>
+            <a:off x="1368000" y="2700000"/>
+            <a:ext cx="540000" cy="216000"/>
+          </a:xfrm>
+          <a:prstGeom prst="rect">
+            <a:avLst/>
+          </a:prstGeom>
+          <a:noFill/>
+          <a:ln w="9525">
+            <a:noFill/>
+          </a:ln>
+        </p:spPr>
+        <p:style>
+          <a:lnRef idx="2">
+            <a:schemeClr val="accent1">
+              <a:shade val="50000"/>
+            </a:schemeClr>
+          </a:lnRef>
+          <a:fillRef idx="1">
+            <a:schemeClr val="accent1"/>
+          </a:fillRef>
+          <a:effectRef idx="0">
+            <a:schemeClr val="accent1"/>
+          </a:effectRef>
+          <a:fontRef idx="minor">
+            <a:schemeClr val="lt1"/>
+          </a:fontRef>
+        </p:style>
+        <p:txBody>
+          <a:bodyPr rtlCol="0" anchor="ctr"/>
+          <a:lstStyle/>
+          <a:p>
+            <a:pPr algn="r"/>
+            <a:r>
+              <a:rPr lang="en-AU" sz="1200" dirty="0" smtClean="0">
+                <a:solidFill>
+                  <a:sysClr val="windowText" lastClr="000000"/>
+                </a:solidFill>
+              </a:rPr>
+              <a:t>1.389</a:t>
+            </a:r>
+            <a:endParaRPr lang="en-AU" sz="1200" dirty="0">
+              <a:solidFill>
+                <a:sysClr val="windowText" lastClr="000000"/>
+              </a:solidFill>
+            </a:endParaRPr>
+          </a:p>
+        </p:txBody>
+      </p:sp>
+      <p:sp>
+        <p:nvSpPr>
+          <p:cNvPr id="31" name="Left Brace 30"/>
+          <p:cNvSpPr/>
+          <p:nvPr/>
+        </p:nvSpPr>
+        <p:spPr>
+          <a:xfrm>
+            <a:off x="1296000" y="864000"/>
+            <a:ext cx="72000" cy="1080000"/>
+          </a:xfrm>
+          <a:prstGeom prst="leftBrace">
+            <a:avLst/>
+          </a:prstGeom>
+          <a:ln>
+            <a:solidFill>
+              <a:schemeClr val="tx1"/>
+            </a:solidFill>
+          </a:ln>
+        </p:spPr>
+        <p:style>
+          <a:lnRef idx="1">
+            <a:schemeClr val="accent1"/>
+          </a:lnRef>
+          <a:fillRef idx="0">
+            <a:schemeClr val="accent1"/>
+          </a:fillRef>
+          <a:effectRef idx="0">
+            <a:schemeClr val="accent1"/>
+          </a:effectRef>
+          <a:fontRef idx="minor">
+            <a:schemeClr val="tx1"/>
+          </a:fontRef>
+        </p:style>
+        <p:txBody>
+          <a:bodyPr rtlCol="0" anchor="ctr"/>
+          <a:lstStyle/>
+          <a:p>
+            <a:pPr algn="ctr"/>
+            <a:endParaRPr lang="en-AU" dirty="0"/>
+          </a:p>
+        </p:txBody>
+      </p:sp>
+      <p:sp>
+        <p:nvSpPr>
+          <p:cNvPr id="34" name="Rectangle 33"/>
+          <p:cNvSpPr/>
+          <p:nvPr/>
+        </p:nvSpPr>
+        <p:spPr>
+          <a:xfrm>
+            <a:off x="0" y="1080000"/>
+            <a:ext cx="1296000" cy="648000"/>
+          </a:xfrm>
+          <a:prstGeom prst="rect">
+            <a:avLst/>
+          </a:prstGeom>
+          <a:noFill/>
+          <a:ln w="9525">
+            <a:noFill/>
+          </a:ln>
+        </p:spPr>
+        <p:style>
+          <a:lnRef idx="2">
+            <a:schemeClr val="accent1">
+              <a:shade val="50000"/>
+            </a:schemeClr>
+          </a:lnRef>
+          <a:fillRef idx="1">
+            <a:schemeClr val="accent1"/>
+          </a:fillRef>
+          <a:effectRef idx="0">
+            <a:schemeClr val="accent1"/>
+          </a:effectRef>
+          <a:fontRef idx="minor">
+            <a:schemeClr val="lt1"/>
+          </a:fontRef>
+        </p:style>
+        <p:txBody>
+          <a:bodyPr rtlCol="0" anchor="ctr"/>
+          <a:lstStyle/>
+          <a:p>
+            <a:pPr algn="r"/>
+            <a:r>
+              <a:rPr lang="en-AU" sz="1200" dirty="0" smtClean="0">
+                <a:solidFill>
+                  <a:sysClr val="windowText" lastClr="000000"/>
+                </a:solidFill>
+              </a:rPr>
+              <a:t>Round-trip time</a:t>
+            </a:r>
+          </a:p>
+          <a:p>
+            <a:pPr algn="r"/>
+            <a:r>
+              <a:rPr lang="en-AU" sz="1200" dirty="0" smtClean="0">
+                <a:solidFill>
+                  <a:sysClr val="windowText" lastClr="000000"/>
+                </a:solidFill>
+              </a:rPr>
+              <a:t>1.06</a:t>
+            </a:r>
+            <a:r>
+              <a:rPr lang="en-AU" sz="1200" dirty="0" smtClean="0">
+                <a:solidFill>
+                  <a:sysClr val="windowText" lastClr="000000"/>
+                </a:solidFill>
+              </a:rPr>
+              <a:t> </a:t>
+            </a:r>
+            <a:r>
+              <a:rPr lang="en-AU" sz="1200" dirty="0" err="1" smtClean="0">
+                <a:solidFill>
+                  <a:sysClr val="windowText" lastClr="000000"/>
+                </a:solidFill>
+              </a:rPr>
+              <a:t>ms</a:t>
+            </a:r>
+            <a:endParaRPr lang="en-AU" sz="1200" dirty="0">
+              <a:solidFill>
+                <a:sysClr val="windowText" lastClr="000000"/>
+              </a:solidFill>
+            </a:endParaRPr>
+          </a:p>
+        </p:txBody>
+      </p:sp>
+    </p:spTree>
+    <p:extLst>
+      <p:ext uri="{BB962C8B-B14F-4D97-AF65-F5344CB8AC3E}">
+        <p14:creationId xmlns:p14="http://schemas.microsoft.com/office/powerpoint/2010/main" val="1880301576"/>
       </p:ext>
     </p:extLst>
   </p:cSld>

</xml_diff>

<commit_message>
completed workshop 10 and 11 lab exercises answers
</commit_message>
<xml_diff>
--- a/workshop/ws-10-11-lab-answers/diagrams.pptx
+++ b/workshop/ws-10-11-lab-answers/diagrams.pptx
@@ -9,6 +9,7 @@
     <p:sldId id="257" r:id="rId3"/>
     <p:sldId id="258" r:id="rId4"/>
     <p:sldId id="259" r:id="rId5"/>
+    <p:sldId id="260" r:id="rId6"/>
   </p:sldIdLst>
   <p:sldSz cx="9144000" cy="6858000" type="screen4x3"/>
   <p:notesSz cx="6858000" cy="9144000"/>
@@ -291,7 +292,7 @@
           <a:p>
             <a:fld id="{89E11006-DE25-44A1-89C0-96196B256A9F}" type="datetimeFigureOut">
               <a:rPr lang="en-AU" smtClean="0"/>
-              <a:t>16/05/2016</a:t>
+              <a:t>17/05/2016</a:t>
             </a:fld>
             <a:endParaRPr lang="en-AU"/>
           </a:p>
@@ -461,7 +462,7 @@
           <a:p>
             <a:fld id="{89E11006-DE25-44A1-89C0-96196B256A9F}" type="datetimeFigureOut">
               <a:rPr lang="en-AU" smtClean="0"/>
-              <a:t>16/05/2016</a:t>
+              <a:t>17/05/2016</a:t>
             </a:fld>
             <a:endParaRPr lang="en-AU"/>
           </a:p>
@@ -641,7 +642,7 @@
           <a:p>
             <a:fld id="{89E11006-DE25-44A1-89C0-96196B256A9F}" type="datetimeFigureOut">
               <a:rPr lang="en-AU" smtClean="0"/>
-              <a:t>16/05/2016</a:t>
+              <a:t>17/05/2016</a:t>
             </a:fld>
             <a:endParaRPr lang="en-AU"/>
           </a:p>
@@ -811,7 +812,7 @@
           <a:p>
             <a:fld id="{89E11006-DE25-44A1-89C0-96196B256A9F}" type="datetimeFigureOut">
               <a:rPr lang="en-AU" smtClean="0"/>
-              <a:t>16/05/2016</a:t>
+              <a:t>17/05/2016</a:t>
             </a:fld>
             <a:endParaRPr lang="en-AU"/>
           </a:p>
@@ -1057,7 +1058,7 @@
           <a:p>
             <a:fld id="{89E11006-DE25-44A1-89C0-96196B256A9F}" type="datetimeFigureOut">
               <a:rPr lang="en-AU" smtClean="0"/>
-              <a:t>16/05/2016</a:t>
+              <a:t>17/05/2016</a:t>
             </a:fld>
             <a:endParaRPr lang="en-AU"/>
           </a:p>
@@ -1345,7 +1346,7 @@
           <a:p>
             <a:fld id="{89E11006-DE25-44A1-89C0-96196B256A9F}" type="datetimeFigureOut">
               <a:rPr lang="en-AU" smtClean="0"/>
-              <a:t>16/05/2016</a:t>
+              <a:t>17/05/2016</a:t>
             </a:fld>
             <a:endParaRPr lang="en-AU"/>
           </a:p>
@@ -1767,7 +1768,7 @@
           <a:p>
             <a:fld id="{89E11006-DE25-44A1-89C0-96196B256A9F}" type="datetimeFigureOut">
               <a:rPr lang="en-AU" smtClean="0"/>
-              <a:t>16/05/2016</a:t>
+              <a:t>17/05/2016</a:t>
             </a:fld>
             <a:endParaRPr lang="en-AU"/>
           </a:p>
@@ -1885,7 +1886,7 @@
           <a:p>
             <a:fld id="{89E11006-DE25-44A1-89C0-96196B256A9F}" type="datetimeFigureOut">
               <a:rPr lang="en-AU" smtClean="0"/>
-              <a:t>16/05/2016</a:t>
+              <a:t>17/05/2016</a:t>
             </a:fld>
             <a:endParaRPr lang="en-AU"/>
           </a:p>
@@ -1980,7 +1981,7 @@
           <a:p>
             <a:fld id="{89E11006-DE25-44A1-89C0-96196B256A9F}" type="datetimeFigureOut">
               <a:rPr lang="en-AU" smtClean="0"/>
-              <a:t>16/05/2016</a:t>
+              <a:t>17/05/2016</a:t>
             </a:fld>
             <a:endParaRPr lang="en-AU"/>
           </a:p>
@@ -2257,7 +2258,7 @@
           <a:p>
             <a:fld id="{89E11006-DE25-44A1-89C0-96196B256A9F}" type="datetimeFigureOut">
               <a:rPr lang="en-AU" smtClean="0"/>
-              <a:t>16/05/2016</a:t>
+              <a:t>17/05/2016</a:t>
             </a:fld>
             <a:endParaRPr lang="en-AU"/>
           </a:p>
@@ -2510,7 +2511,7 @@
           <a:p>
             <a:fld id="{89E11006-DE25-44A1-89C0-96196B256A9F}" type="datetimeFigureOut">
               <a:rPr lang="en-AU" smtClean="0"/>
-              <a:t>16/05/2016</a:t>
+              <a:t>17/05/2016</a:t>
             </a:fld>
             <a:endParaRPr lang="en-AU"/>
           </a:p>
@@ -2723,7 +2724,7 @@
           <a:p>
             <a:fld id="{89E11006-DE25-44A1-89C0-96196B256A9F}" type="datetimeFigureOut">
               <a:rPr lang="en-AU" smtClean="0"/>
-              <a:t>16/05/2016</a:t>
+              <a:t>17/05/2016</a:t>
             </a:fld>
             <a:endParaRPr lang="en-AU"/>
           </a:p>
@@ -6778,11 +6779,6 @@
               </a:rPr>
               <a:t>Computer</a:t>
             </a:r>
-            <a:endParaRPr lang="en-AU" sz="1200" i="1" dirty="0" smtClean="0">
-              <a:solidFill>
-                <a:sysClr val="windowText" lastClr="000000"/>
-              </a:solidFill>
-            </a:endParaRPr>
           </a:p>
           <a:p>
             <a:pPr algn="ctr"/>
@@ -6861,11 +6857,6 @@
               </a:rPr>
               <a:t>Remote Server</a:t>
             </a:r>
-            <a:endParaRPr lang="en-AU" sz="1200" i="1" dirty="0" smtClean="0">
-              <a:solidFill>
-                <a:sysClr val="windowText" lastClr="000000"/>
-              </a:solidFill>
-            </a:endParaRPr>
           </a:p>
           <a:p>
             <a:pPr algn="ctr"/>
@@ -7936,15 +7927,7 @@
                   <a:sysClr val="windowText" lastClr="000000"/>
                 </a:solidFill>
               </a:rPr>
-              <a:t>1.06</a:t>
-            </a:r>
-            <a:r>
-              <a:rPr lang="en-AU" sz="1200" dirty="0" smtClean="0">
-                <a:solidFill>
-                  <a:sysClr val="windowText" lastClr="000000"/>
-                </a:solidFill>
-              </a:rPr>
-              <a:t> </a:t>
+              <a:t>1.06 </a:t>
             </a:r>
             <a:r>
               <a:rPr lang="en-AU" sz="1200" dirty="0" err="1" smtClean="0">
@@ -7966,6 +7949,1070 @@
     <p:extLst>
       <p:ext uri="{BB962C8B-B14F-4D97-AF65-F5344CB8AC3E}">
         <p14:creationId xmlns:p14="http://schemas.microsoft.com/office/powerpoint/2010/main" val="1880301576"/>
+      </p:ext>
+    </p:extLst>
+  </p:cSld>
+  <p:clrMapOvr>
+    <a:masterClrMapping/>
+  </p:clrMapOvr>
+</p:sld>
+</file>
+
+<file path=ppt/slides/slide5.xml><?xml version="1.0" encoding="utf-8"?>
+<p:sld xmlns:a="http://schemas.openxmlformats.org/drawingml/2006/main" xmlns:r="http://schemas.openxmlformats.org/officeDocument/2006/relationships" xmlns:p="http://schemas.openxmlformats.org/presentationml/2006/main">
+  <p:cSld>
+    <p:spTree>
+      <p:nvGrpSpPr>
+        <p:cNvPr id="1" name=""/>
+        <p:cNvGrpSpPr/>
+        <p:nvPr/>
+      </p:nvGrpSpPr>
+      <p:grpSpPr>
+        <a:xfrm>
+          <a:off x="0" y="0"/>
+          <a:ext cx="0" cy="0"/>
+          <a:chOff x="0" y="0"/>
+          <a:chExt cx="0" cy="0"/>
+        </a:xfrm>
+      </p:grpSpPr>
+      <p:sp>
+        <p:nvSpPr>
+          <p:cNvPr id="2" name="Rectangle 1"/>
+          <p:cNvSpPr/>
+          <p:nvPr/>
+        </p:nvSpPr>
+        <p:spPr>
+          <a:xfrm>
+            <a:off x="1296000" y="0"/>
+            <a:ext cx="1296000" cy="648000"/>
+          </a:xfrm>
+          <a:prstGeom prst="rect">
+            <a:avLst/>
+          </a:prstGeom>
+          <a:noFill/>
+          <a:ln w="9525">
+            <a:noFill/>
+          </a:ln>
+        </p:spPr>
+        <p:style>
+          <a:lnRef idx="2">
+            <a:schemeClr val="accent1">
+              <a:shade val="50000"/>
+            </a:schemeClr>
+          </a:lnRef>
+          <a:fillRef idx="1">
+            <a:schemeClr val="accent1"/>
+          </a:fillRef>
+          <a:effectRef idx="0">
+            <a:schemeClr val="accent1"/>
+          </a:effectRef>
+          <a:fontRef idx="minor">
+            <a:schemeClr val="lt1"/>
+          </a:fontRef>
+        </p:style>
+        <p:txBody>
+          <a:bodyPr rtlCol="0" anchor="ctr"/>
+          <a:lstStyle/>
+          <a:p>
+            <a:pPr algn="ctr"/>
+            <a:r>
+              <a:rPr lang="en-AU" sz="1200" dirty="0" smtClean="0">
+                <a:solidFill>
+                  <a:sysClr val="windowText" lastClr="000000"/>
+                </a:solidFill>
+              </a:rPr>
+              <a:t>Host</a:t>
+            </a:r>
+          </a:p>
+          <a:p>
+            <a:pPr algn="ctr"/>
+            <a:r>
+              <a:rPr lang="en-AU" sz="1200" i="1" dirty="0">
+                <a:solidFill>
+                  <a:sysClr val="windowText" lastClr="000000"/>
+                </a:solidFill>
+              </a:rPr>
+              <a:t>My </a:t>
+            </a:r>
+            <a:r>
+              <a:rPr lang="en-AU" sz="1200" i="1" dirty="0" smtClean="0">
+                <a:solidFill>
+                  <a:sysClr val="windowText" lastClr="000000"/>
+                </a:solidFill>
+              </a:rPr>
+              <a:t>Computer</a:t>
+            </a:r>
+          </a:p>
+          <a:p>
+            <a:pPr algn="ctr"/>
+            <a:r>
+              <a:rPr lang="en-AU" sz="1200" dirty="0" smtClean="0">
+                <a:solidFill>
+                  <a:sysClr val="windowText" lastClr="000000"/>
+                </a:solidFill>
+              </a:rPr>
+              <a:t>10.96.200.173</a:t>
+            </a:r>
+            <a:endParaRPr lang="en-AU" sz="1200" dirty="0">
+              <a:solidFill>
+                <a:sysClr val="windowText" lastClr="000000"/>
+              </a:solidFill>
+            </a:endParaRPr>
+          </a:p>
+        </p:txBody>
+      </p:sp>
+      <p:sp>
+        <p:nvSpPr>
+          <p:cNvPr id="3" name="Rectangle 2"/>
+          <p:cNvSpPr/>
+          <p:nvPr/>
+        </p:nvSpPr>
+        <p:spPr>
+          <a:xfrm>
+            <a:off x="5184000" y="0"/>
+            <a:ext cx="1296000" cy="648000"/>
+          </a:xfrm>
+          <a:prstGeom prst="rect">
+            <a:avLst/>
+          </a:prstGeom>
+          <a:noFill/>
+          <a:ln w="9525">
+            <a:noFill/>
+          </a:ln>
+        </p:spPr>
+        <p:style>
+          <a:lnRef idx="2">
+            <a:schemeClr val="accent1">
+              <a:shade val="50000"/>
+            </a:schemeClr>
+          </a:lnRef>
+          <a:fillRef idx="1">
+            <a:schemeClr val="accent1"/>
+          </a:fillRef>
+          <a:effectRef idx="0">
+            <a:schemeClr val="accent1"/>
+          </a:effectRef>
+          <a:fontRef idx="minor">
+            <a:schemeClr val="lt1"/>
+          </a:fontRef>
+        </p:style>
+        <p:txBody>
+          <a:bodyPr rtlCol="0" anchor="ctr"/>
+          <a:lstStyle/>
+          <a:p>
+            <a:pPr algn="ctr"/>
+            <a:r>
+              <a:rPr lang="en-AU" sz="1200" dirty="0" smtClean="0">
+                <a:solidFill>
+                  <a:sysClr val="windowText" lastClr="000000"/>
+                </a:solidFill>
+              </a:rPr>
+              <a:t>Host</a:t>
+            </a:r>
+          </a:p>
+          <a:p>
+            <a:pPr algn="ctr"/>
+            <a:r>
+              <a:rPr lang="en-AU" sz="1200" i="1" dirty="0" smtClean="0">
+                <a:solidFill>
+                  <a:sysClr val="windowText" lastClr="000000"/>
+                </a:solidFill>
+              </a:rPr>
+              <a:t>Remote Server</a:t>
+            </a:r>
+          </a:p>
+          <a:p>
+            <a:pPr algn="ctr"/>
+            <a:r>
+              <a:rPr lang="en-AU" sz="1200" dirty="0" smtClean="0">
+                <a:solidFill>
+                  <a:sysClr val="windowText" lastClr="000000"/>
+                </a:solidFill>
+              </a:rPr>
+              <a:t>www.google.com</a:t>
+            </a:r>
+            <a:endParaRPr lang="en-AU" sz="1200" dirty="0">
+              <a:solidFill>
+                <a:sysClr val="windowText" lastClr="000000"/>
+              </a:solidFill>
+            </a:endParaRPr>
+          </a:p>
+        </p:txBody>
+      </p:sp>
+      <p:cxnSp>
+        <p:nvCxnSpPr>
+          <p:cNvPr id="4" name="Straight Connector 3"/>
+          <p:cNvCxnSpPr/>
+          <p:nvPr/>
+        </p:nvCxnSpPr>
+        <p:spPr>
+          <a:xfrm>
+            <a:off x="1944000" y="648000"/>
+            <a:ext cx="0" cy="2160000"/>
+          </a:xfrm>
+          <a:prstGeom prst="line">
+            <a:avLst/>
+          </a:prstGeom>
+          <a:ln>
+            <a:solidFill>
+              <a:schemeClr val="tx1"/>
+            </a:solidFill>
+            <a:headEnd type="none" w="med" len="med"/>
+            <a:tailEnd type="triangle" w="med" len="med"/>
+          </a:ln>
+        </p:spPr>
+        <p:style>
+          <a:lnRef idx="1">
+            <a:schemeClr val="accent1"/>
+          </a:lnRef>
+          <a:fillRef idx="0">
+            <a:schemeClr val="accent1"/>
+          </a:fillRef>
+          <a:effectRef idx="0">
+            <a:schemeClr val="accent1"/>
+          </a:effectRef>
+          <a:fontRef idx="minor">
+            <a:schemeClr val="tx1"/>
+          </a:fontRef>
+        </p:style>
+      </p:cxnSp>
+      <p:cxnSp>
+        <p:nvCxnSpPr>
+          <p:cNvPr id="5" name="Straight Connector 4"/>
+          <p:cNvCxnSpPr/>
+          <p:nvPr/>
+        </p:nvCxnSpPr>
+        <p:spPr>
+          <a:xfrm>
+            <a:off x="5832000" y="648000"/>
+            <a:ext cx="0" cy="2160000"/>
+          </a:xfrm>
+          <a:prstGeom prst="line">
+            <a:avLst/>
+          </a:prstGeom>
+          <a:ln>
+            <a:solidFill>
+              <a:schemeClr val="tx1"/>
+            </a:solidFill>
+            <a:headEnd type="none" w="med" len="med"/>
+            <a:tailEnd type="triangle" w="med" len="med"/>
+          </a:ln>
+        </p:spPr>
+        <p:style>
+          <a:lnRef idx="1">
+            <a:schemeClr val="accent1"/>
+          </a:lnRef>
+          <a:fillRef idx="0">
+            <a:schemeClr val="accent1"/>
+          </a:fillRef>
+          <a:effectRef idx="0">
+            <a:schemeClr val="accent1"/>
+          </a:effectRef>
+          <a:fontRef idx="minor">
+            <a:schemeClr val="tx1"/>
+          </a:fontRef>
+        </p:style>
+      </p:cxnSp>
+      <p:cxnSp>
+        <p:nvCxnSpPr>
+          <p:cNvPr id="6" name="Straight Arrow Connector 5"/>
+          <p:cNvCxnSpPr/>
+          <p:nvPr/>
+        </p:nvCxnSpPr>
+        <p:spPr>
+          <a:xfrm>
+            <a:off x="1944000" y="864000"/>
+            <a:ext cx="3888000" cy="432000"/>
+          </a:xfrm>
+          <a:prstGeom prst="straightConnector1">
+            <a:avLst/>
+          </a:prstGeom>
+          <a:ln>
+            <a:solidFill>
+              <a:schemeClr val="tx1"/>
+            </a:solidFill>
+            <a:tailEnd type="arrow"/>
+          </a:ln>
+        </p:spPr>
+        <p:style>
+          <a:lnRef idx="1">
+            <a:schemeClr val="accent1"/>
+          </a:lnRef>
+          <a:fillRef idx="0">
+            <a:schemeClr val="accent1"/>
+          </a:fillRef>
+          <a:effectRef idx="0">
+            <a:schemeClr val="accent1"/>
+          </a:effectRef>
+          <a:fontRef idx="minor">
+            <a:schemeClr val="tx1"/>
+          </a:fontRef>
+        </p:style>
+      </p:cxnSp>
+      <p:sp>
+        <p:nvSpPr>
+          <p:cNvPr id="7" name="Rectangle 6"/>
+          <p:cNvSpPr/>
+          <p:nvPr/>
+        </p:nvSpPr>
+        <p:spPr>
+          <a:xfrm>
+            <a:off x="2592000" y="792000"/>
+            <a:ext cx="2592000" cy="216000"/>
+          </a:xfrm>
+          <a:prstGeom prst="rect">
+            <a:avLst/>
+          </a:prstGeom>
+          <a:noFill/>
+          <a:ln w="9525">
+            <a:noFill/>
+          </a:ln>
+        </p:spPr>
+        <p:style>
+          <a:lnRef idx="2">
+            <a:schemeClr val="accent1">
+              <a:shade val="50000"/>
+            </a:schemeClr>
+          </a:lnRef>
+          <a:fillRef idx="1">
+            <a:schemeClr val="accent1"/>
+          </a:fillRef>
+          <a:effectRef idx="0">
+            <a:schemeClr val="accent1"/>
+          </a:effectRef>
+          <a:fontRef idx="minor">
+            <a:schemeClr val="lt1"/>
+          </a:fontRef>
+        </p:style>
+        <p:txBody>
+          <a:bodyPr rtlCol="0" anchor="ctr"/>
+          <a:lstStyle/>
+          <a:p>
+            <a:pPr algn="ctr"/>
+            <a:r>
+              <a:rPr lang="en-AU" sz="1200" dirty="0" smtClean="0">
+                <a:solidFill>
+                  <a:sysClr val="windowText" lastClr="000000"/>
+                </a:solidFill>
+              </a:rPr>
+              <a:t>FIN</a:t>
+            </a:r>
+            <a:r>
+              <a:rPr lang="en-AU" sz="1200" dirty="0">
+                <a:solidFill>
+                  <a:sysClr val="windowText" lastClr="000000"/>
+                </a:solidFill>
+              </a:rPr>
+              <a:t>, ACK (</a:t>
+            </a:r>
+            <a:r>
+              <a:rPr lang="en-AU" sz="1200" dirty="0" err="1" smtClean="0">
+                <a:solidFill>
+                  <a:sysClr val="windowText" lastClr="000000"/>
+                </a:solidFill>
+              </a:rPr>
+              <a:t>Seq</a:t>
+            </a:r>
+            <a:r>
+              <a:rPr lang="en-AU" sz="1200" dirty="0" smtClean="0">
+                <a:solidFill>
+                  <a:sysClr val="windowText" lastClr="000000"/>
+                </a:solidFill>
+              </a:rPr>
+              <a:t>=262, </a:t>
+            </a:r>
+            <a:r>
+              <a:rPr lang="en-AU" sz="1200" dirty="0" err="1" smtClean="0">
+                <a:solidFill>
+                  <a:sysClr val="windowText" lastClr="000000"/>
+                </a:solidFill>
+              </a:rPr>
+              <a:t>Ack</a:t>
+            </a:r>
+            <a:r>
+              <a:rPr lang="en-AU" sz="1200" dirty="0" smtClean="0">
+                <a:solidFill>
+                  <a:sysClr val="windowText" lastClr="000000"/>
+                </a:solidFill>
+              </a:rPr>
+              <a:t>=11707)</a:t>
+            </a:r>
+            <a:endParaRPr lang="en-AU" sz="1200" dirty="0">
+              <a:solidFill>
+                <a:sysClr val="windowText" lastClr="000000"/>
+              </a:solidFill>
+            </a:endParaRPr>
+          </a:p>
+        </p:txBody>
+      </p:sp>
+      <p:cxnSp>
+        <p:nvCxnSpPr>
+          <p:cNvPr id="8" name="Straight Arrow Connector 7"/>
+          <p:cNvCxnSpPr/>
+          <p:nvPr/>
+        </p:nvCxnSpPr>
+        <p:spPr>
+          <a:xfrm flipV="1">
+            <a:off x="1944000" y="1512000"/>
+            <a:ext cx="3888000" cy="432000"/>
+          </a:xfrm>
+          <a:prstGeom prst="straightConnector1">
+            <a:avLst/>
+          </a:prstGeom>
+          <a:ln>
+            <a:solidFill>
+              <a:schemeClr val="tx1"/>
+            </a:solidFill>
+            <a:headEnd type="arrow" w="med" len="med"/>
+            <a:tailEnd type="none" w="med" len="med"/>
+          </a:ln>
+        </p:spPr>
+        <p:style>
+          <a:lnRef idx="1">
+            <a:schemeClr val="accent1"/>
+          </a:lnRef>
+          <a:fillRef idx="0">
+            <a:schemeClr val="accent1"/>
+          </a:fillRef>
+          <a:effectRef idx="0">
+            <a:schemeClr val="accent1"/>
+          </a:effectRef>
+          <a:fontRef idx="minor">
+            <a:schemeClr val="tx1"/>
+          </a:fontRef>
+        </p:style>
+      </p:cxnSp>
+      <p:sp>
+        <p:nvSpPr>
+          <p:cNvPr id="9" name="Rectangle 8"/>
+          <p:cNvSpPr/>
+          <p:nvPr/>
+        </p:nvSpPr>
+        <p:spPr>
+          <a:xfrm>
+            <a:off x="2592000" y="1440000"/>
+            <a:ext cx="2592000" cy="216000"/>
+          </a:xfrm>
+          <a:prstGeom prst="rect">
+            <a:avLst/>
+          </a:prstGeom>
+          <a:noFill/>
+          <a:ln w="9525">
+            <a:noFill/>
+          </a:ln>
+        </p:spPr>
+        <p:style>
+          <a:lnRef idx="2">
+            <a:schemeClr val="accent1">
+              <a:shade val="50000"/>
+            </a:schemeClr>
+          </a:lnRef>
+          <a:fillRef idx="1">
+            <a:schemeClr val="accent1"/>
+          </a:fillRef>
+          <a:effectRef idx="0">
+            <a:schemeClr val="accent1"/>
+          </a:effectRef>
+          <a:fontRef idx="minor">
+            <a:schemeClr val="lt1"/>
+          </a:fontRef>
+        </p:style>
+        <p:txBody>
+          <a:bodyPr rtlCol="0" anchor="ctr"/>
+          <a:lstStyle/>
+          <a:p>
+            <a:pPr algn="ctr"/>
+            <a:r>
+              <a:rPr lang="en-AU" sz="1200" dirty="0" smtClean="0">
+                <a:solidFill>
+                  <a:sysClr val="windowText" lastClr="000000"/>
+                </a:solidFill>
+              </a:rPr>
+              <a:t>FIN, ACK (</a:t>
+            </a:r>
+            <a:r>
+              <a:rPr lang="en-AU" sz="1200" dirty="0" err="1" smtClean="0">
+                <a:solidFill>
+                  <a:sysClr val="windowText" lastClr="000000"/>
+                </a:solidFill>
+              </a:rPr>
+              <a:t>Seq</a:t>
+            </a:r>
+            <a:r>
+              <a:rPr lang="en-AU" sz="1200" dirty="0" smtClean="0">
+                <a:solidFill>
+                  <a:sysClr val="windowText" lastClr="000000"/>
+                </a:solidFill>
+              </a:rPr>
+              <a:t>=11707, </a:t>
+            </a:r>
+            <a:r>
+              <a:rPr lang="en-AU" sz="1200" dirty="0" err="1" smtClean="0">
+                <a:solidFill>
+                  <a:sysClr val="windowText" lastClr="000000"/>
+                </a:solidFill>
+              </a:rPr>
+              <a:t>Ack</a:t>
+            </a:r>
+            <a:r>
+              <a:rPr lang="en-AU" sz="1200" dirty="0" smtClean="0">
+                <a:solidFill>
+                  <a:sysClr val="windowText" lastClr="000000"/>
+                </a:solidFill>
+              </a:rPr>
+              <a:t>=263)</a:t>
+            </a:r>
+            <a:endParaRPr lang="en-AU" sz="1200" dirty="0">
+              <a:solidFill>
+                <a:sysClr val="windowText" lastClr="000000"/>
+              </a:solidFill>
+            </a:endParaRPr>
+          </a:p>
+        </p:txBody>
+      </p:sp>
+      <p:cxnSp>
+        <p:nvCxnSpPr>
+          <p:cNvPr id="10" name="Straight Arrow Connector 9"/>
+          <p:cNvCxnSpPr/>
+          <p:nvPr/>
+        </p:nvCxnSpPr>
+        <p:spPr>
+          <a:xfrm>
+            <a:off x="1944000" y="2160000"/>
+            <a:ext cx="3888000" cy="432000"/>
+          </a:xfrm>
+          <a:prstGeom prst="straightConnector1">
+            <a:avLst/>
+          </a:prstGeom>
+          <a:ln>
+            <a:solidFill>
+              <a:schemeClr val="tx1"/>
+            </a:solidFill>
+            <a:tailEnd type="arrow"/>
+          </a:ln>
+        </p:spPr>
+        <p:style>
+          <a:lnRef idx="1">
+            <a:schemeClr val="accent1"/>
+          </a:lnRef>
+          <a:fillRef idx="0">
+            <a:schemeClr val="accent1"/>
+          </a:fillRef>
+          <a:effectRef idx="0">
+            <a:schemeClr val="accent1"/>
+          </a:effectRef>
+          <a:fontRef idx="minor">
+            <a:schemeClr val="tx1"/>
+          </a:fontRef>
+        </p:style>
+      </p:cxnSp>
+      <p:sp>
+        <p:nvSpPr>
+          <p:cNvPr id="11" name="Rectangle 10"/>
+          <p:cNvSpPr/>
+          <p:nvPr/>
+        </p:nvSpPr>
+        <p:spPr>
+          <a:xfrm>
+            <a:off x="2592000" y="2088000"/>
+            <a:ext cx="2592000" cy="216000"/>
+          </a:xfrm>
+          <a:prstGeom prst="rect">
+            <a:avLst/>
+          </a:prstGeom>
+          <a:noFill/>
+          <a:ln w="9525">
+            <a:noFill/>
+          </a:ln>
+        </p:spPr>
+        <p:style>
+          <a:lnRef idx="2">
+            <a:schemeClr val="accent1">
+              <a:shade val="50000"/>
+            </a:schemeClr>
+          </a:lnRef>
+          <a:fillRef idx="1">
+            <a:schemeClr val="accent1"/>
+          </a:fillRef>
+          <a:effectRef idx="0">
+            <a:schemeClr val="accent1"/>
+          </a:effectRef>
+          <a:fontRef idx="minor">
+            <a:schemeClr val="lt1"/>
+          </a:fontRef>
+        </p:style>
+        <p:txBody>
+          <a:bodyPr rtlCol="0" anchor="ctr"/>
+          <a:lstStyle/>
+          <a:p>
+            <a:pPr algn="ctr"/>
+            <a:r>
+              <a:rPr lang="en-AU" sz="1200" dirty="0" smtClean="0">
+                <a:solidFill>
+                  <a:sysClr val="windowText" lastClr="000000"/>
+                </a:solidFill>
+              </a:rPr>
+              <a:t>ACK (</a:t>
+            </a:r>
+            <a:r>
+              <a:rPr lang="en-AU" sz="1200" dirty="0" err="1" smtClean="0">
+                <a:solidFill>
+                  <a:sysClr val="windowText" lastClr="000000"/>
+                </a:solidFill>
+              </a:rPr>
+              <a:t>Seq</a:t>
+            </a:r>
+            <a:r>
+              <a:rPr lang="en-AU" sz="1200" dirty="0" smtClean="0">
+                <a:solidFill>
+                  <a:sysClr val="windowText" lastClr="000000"/>
+                </a:solidFill>
+              </a:rPr>
+              <a:t>=263, </a:t>
+            </a:r>
+            <a:r>
+              <a:rPr lang="en-AU" sz="1200" dirty="0" err="1" smtClean="0">
+                <a:solidFill>
+                  <a:sysClr val="windowText" lastClr="000000"/>
+                </a:solidFill>
+              </a:rPr>
+              <a:t>Ack</a:t>
+            </a:r>
+            <a:r>
+              <a:rPr lang="en-AU" sz="1200" dirty="0" smtClean="0">
+                <a:solidFill>
+                  <a:sysClr val="windowText" lastClr="000000"/>
+                </a:solidFill>
+              </a:rPr>
+              <a:t>=11708)</a:t>
+            </a:r>
+            <a:endParaRPr lang="en-AU" sz="1200" dirty="0">
+              <a:solidFill>
+                <a:sysClr val="windowText" lastClr="000000"/>
+              </a:solidFill>
+            </a:endParaRPr>
+          </a:p>
+        </p:txBody>
+      </p:sp>
+      <p:sp>
+        <p:nvSpPr>
+          <p:cNvPr id="14" name="Rectangle 13"/>
+          <p:cNvSpPr/>
+          <p:nvPr/>
+        </p:nvSpPr>
+        <p:spPr>
+          <a:xfrm>
+            <a:off x="1368000" y="756000"/>
+            <a:ext cx="540000" cy="216000"/>
+          </a:xfrm>
+          <a:prstGeom prst="rect">
+            <a:avLst/>
+          </a:prstGeom>
+          <a:noFill/>
+          <a:ln w="9525">
+            <a:noFill/>
+          </a:ln>
+        </p:spPr>
+        <p:style>
+          <a:lnRef idx="2">
+            <a:schemeClr val="accent1">
+              <a:shade val="50000"/>
+            </a:schemeClr>
+          </a:lnRef>
+          <a:fillRef idx="1">
+            <a:schemeClr val="accent1"/>
+          </a:fillRef>
+          <a:effectRef idx="0">
+            <a:schemeClr val="accent1"/>
+          </a:effectRef>
+          <a:fontRef idx="minor">
+            <a:schemeClr val="lt1"/>
+          </a:fontRef>
+        </p:style>
+        <p:txBody>
+          <a:bodyPr rtlCol="0" anchor="ctr"/>
+          <a:lstStyle/>
+          <a:p>
+            <a:pPr algn="r"/>
+            <a:r>
+              <a:rPr lang="en-AU" sz="1200" dirty="0" smtClean="0">
+                <a:solidFill>
+                  <a:sysClr val="windowText" lastClr="000000"/>
+                </a:solidFill>
+              </a:rPr>
+              <a:t>0 </a:t>
+            </a:r>
+            <a:r>
+              <a:rPr lang="en-AU" sz="1200" dirty="0" err="1" smtClean="0">
+                <a:solidFill>
+                  <a:sysClr val="windowText" lastClr="000000"/>
+                </a:solidFill>
+              </a:rPr>
+              <a:t>ms</a:t>
+            </a:r>
+            <a:endParaRPr lang="en-AU" sz="1200" dirty="0">
+              <a:solidFill>
+                <a:sysClr val="windowText" lastClr="000000"/>
+              </a:solidFill>
+            </a:endParaRPr>
+          </a:p>
+        </p:txBody>
+      </p:sp>
+      <p:cxnSp>
+        <p:nvCxnSpPr>
+          <p:cNvPr id="15" name="Straight Connector 14"/>
+          <p:cNvCxnSpPr/>
+          <p:nvPr/>
+        </p:nvCxnSpPr>
+        <p:spPr>
+          <a:xfrm>
+            <a:off x="1908000" y="864000"/>
+            <a:ext cx="36000" cy="0"/>
+          </a:xfrm>
+          <a:prstGeom prst="line">
+            <a:avLst/>
+          </a:prstGeom>
+          <a:ln>
+            <a:solidFill>
+              <a:schemeClr val="tx1"/>
+            </a:solidFill>
+          </a:ln>
+        </p:spPr>
+        <p:style>
+          <a:lnRef idx="1">
+            <a:schemeClr val="accent1"/>
+          </a:lnRef>
+          <a:fillRef idx="0">
+            <a:schemeClr val="accent1"/>
+          </a:fillRef>
+          <a:effectRef idx="0">
+            <a:schemeClr val="accent1"/>
+          </a:effectRef>
+          <a:fontRef idx="minor">
+            <a:schemeClr val="tx1"/>
+          </a:fontRef>
+        </p:style>
+      </p:cxnSp>
+      <p:sp>
+        <p:nvSpPr>
+          <p:cNvPr id="16" name="Rectangle 15"/>
+          <p:cNvSpPr/>
+          <p:nvPr/>
+        </p:nvSpPr>
+        <p:spPr>
+          <a:xfrm>
+            <a:off x="1368000" y="1836000"/>
+            <a:ext cx="540000" cy="216000"/>
+          </a:xfrm>
+          <a:prstGeom prst="rect">
+            <a:avLst/>
+          </a:prstGeom>
+          <a:noFill/>
+          <a:ln w="9525">
+            <a:noFill/>
+          </a:ln>
+        </p:spPr>
+        <p:style>
+          <a:lnRef idx="2">
+            <a:schemeClr val="accent1">
+              <a:shade val="50000"/>
+            </a:schemeClr>
+          </a:lnRef>
+          <a:fillRef idx="1">
+            <a:schemeClr val="accent1"/>
+          </a:fillRef>
+          <a:effectRef idx="0">
+            <a:schemeClr val="accent1"/>
+          </a:effectRef>
+          <a:fontRef idx="minor">
+            <a:schemeClr val="lt1"/>
+          </a:fontRef>
+        </p:style>
+        <p:txBody>
+          <a:bodyPr rtlCol="0" anchor="ctr"/>
+          <a:lstStyle/>
+          <a:p>
+            <a:pPr algn="r"/>
+            <a:r>
+              <a:rPr lang="en-AU" sz="1200" dirty="0" smtClean="0">
+                <a:solidFill>
+                  <a:sysClr val="windowText" lastClr="000000"/>
+                </a:solidFill>
+              </a:rPr>
+              <a:t>0</a:t>
+            </a:r>
+            <a:r>
+              <a:rPr lang="en-AU" sz="1200" dirty="0" smtClean="0">
+                <a:solidFill>
+                  <a:sysClr val="windowText" lastClr="000000"/>
+                </a:solidFill>
+              </a:rPr>
+              <a:t>.810</a:t>
+            </a:r>
+            <a:endParaRPr lang="en-AU" sz="1200" dirty="0">
+              <a:solidFill>
+                <a:sysClr val="windowText" lastClr="000000"/>
+              </a:solidFill>
+            </a:endParaRPr>
+          </a:p>
+        </p:txBody>
+      </p:sp>
+      <p:cxnSp>
+        <p:nvCxnSpPr>
+          <p:cNvPr id="17" name="Straight Connector 16"/>
+          <p:cNvCxnSpPr/>
+          <p:nvPr/>
+        </p:nvCxnSpPr>
+        <p:spPr>
+          <a:xfrm>
+            <a:off x="1908000" y="1944000"/>
+            <a:ext cx="36000" cy="0"/>
+          </a:xfrm>
+          <a:prstGeom prst="line">
+            <a:avLst/>
+          </a:prstGeom>
+          <a:ln>
+            <a:solidFill>
+              <a:schemeClr val="tx1"/>
+            </a:solidFill>
+          </a:ln>
+        </p:spPr>
+        <p:style>
+          <a:lnRef idx="1">
+            <a:schemeClr val="accent1"/>
+          </a:lnRef>
+          <a:fillRef idx="0">
+            <a:schemeClr val="accent1"/>
+          </a:fillRef>
+          <a:effectRef idx="0">
+            <a:schemeClr val="accent1"/>
+          </a:effectRef>
+          <a:fontRef idx="minor">
+            <a:schemeClr val="tx1"/>
+          </a:fontRef>
+        </p:style>
+      </p:cxnSp>
+      <p:cxnSp>
+        <p:nvCxnSpPr>
+          <p:cNvPr id="18" name="Straight Connector 17"/>
+          <p:cNvCxnSpPr/>
+          <p:nvPr/>
+        </p:nvCxnSpPr>
+        <p:spPr>
+          <a:xfrm>
+            <a:off x="1908000" y="2160000"/>
+            <a:ext cx="36000" cy="0"/>
+          </a:xfrm>
+          <a:prstGeom prst="line">
+            <a:avLst/>
+          </a:prstGeom>
+          <a:ln>
+            <a:solidFill>
+              <a:schemeClr val="tx1"/>
+            </a:solidFill>
+          </a:ln>
+        </p:spPr>
+        <p:style>
+          <a:lnRef idx="1">
+            <a:schemeClr val="accent1"/>
+          </a:lnRef>
+          <a:fillRef idx="0">
+            <a:schemeClr val="accent1"/>
+          </a:fillRef>
+          <a:effectRef idx="0">
+            <a:schemeClr val="accent1"/>
+          </a:effectRef>
+          <a:fontRef idx="minor">
+            <a:schemeClr val="tx1"/>
+          </a:fontRef>
+        </p:style>
+      </p:cxnSp>
+      <p:sp>
+        <p:nvSpPr>
+          <p:cNvPr id="19" name="Rectangle 18"/>
+          <p:cNvSpPr/>
+          <p:nvPr/>
+        </p:nvSpPr>
+        <p:spPr>
+          <a:xfrm>
+            <a:off x="1368000" y="2052000"/>
+            <a:ext cx="540000" cy="216000"/>
+          </a:xfrm>
+          <a:prstGeom prst="rect">
+            <a:avLst/>
+          </a:prstGeom>
+          <a:noFill/>
+          <a:ln w="9525">
+            <a:noFill/>
+          </a:ln>
+        </p:spPr>
+        <p:style>
+          <a:lnRef idx="2">
+            <a:schemeClr val="accent1">
+              <a:shade val="50000"/>
+            </a:schemeClr>
+          </a:lnRef>
+          <a:fillRef idx="1">
+            <a:schemeClr val="accent1"/>
+          </a:fillRef>
+          <a:effectRef idx="0">
+            <a:schemeClr val="accent1"/>
+          </a:effectRef>
+          <a:fontRef idx="minor">
+            <a:schemeClr val="lt1"/>
+          </a:fontRef>
+        </p:style>
+        <p:txBody>
+          <a:bodyPr rtlCol="0" anchor="ctr"/>
+          <a:lstStyle/>
+          <a:p>
+            <a:pPr algn="r"/>
+            <a:r>
+              <a:rPr lang="en-AU" sz="1200" dirty="0" smtClean="0">
+                <a:solidFill>
+                  <a:sysClr val="windowText" lastClr="000000"/>
+                </a:solidFill>
+              </a:rPr>
+              <a:t>0.835</a:t>
+            </a:r>
+            <a:endParaRPr lang="en-AU" sz="1200" dirty="0">
+              <a:solidFill>
+                <a:sysClr val="windowText" lastClr="000000"/>
+              </a:solidFill>
+            </a:endParaRPr>
+          </a:p>
+        </p:txBody>
+      </p:sp>
+      <p:sp>
+        <p:nvSpPr>
+          <p:cNvPr id="22" name="Left Brace 21"/>
+          <p:cNvSpPr/>
+          <p:nvPr/>
+        </p:nvSpPr>
+        <p:spPr>
+          <a:xfrm>
+            <a:off x="1296000" y="864000"/>
+            <a:ext cx="72000" cy="1080000"/>
+          </a:xfrm>
+          <a:prstGeom prst="leftBrace">
+            <a:avLst/>
+          </a:prstGeom>
+          <a:ln>
+            <a:solidFill>
+              <a:schemeClr val="tx1"/>
+            </a:solidFill>
+          </a:ln>
+        </p:spPr>
+        <p:style>
+          <a:lnRef idx="1">
+            <a:schemeClr val="accent1"/>
+          </a:lnRef>
+          <a:fillRef idx="0">
+            <a:schemeClr val="accent1"/>
+          </a:fillRef>
+          <a:effectRef idx="0">
+            <a:schemeClr val="accent1"/>
+          </a:effectRef>
+          <a:fontRef idx="minor">
+            <a:schemeClr val="tx1"/>
+          </a:fontRef>
+        </p:style>
+        <p:txBody>
+          <a:bodyPr rtlCol="0" anchor="ctr"/>
+          <a:lstStyle/>
+          <a:p>
+            <a:pPr algn="ctr"/>
+            <a:endParaRPr lang="en-AU" dirty="0"/>
+          </a:p>
+        </p:txBody>
+      </p:sp>
+      <p:sp>
+        <p:nvSpPr>
+          <p:cNvPr id="23" name="Rectangle 22"/>
+          <p:cNvSpPr/>
+          <p:nvPr/>
+        </p:nvSpPr>
+        <p:spPr>
+          <a:xfrm>
+            <a:off x="0" y="1080000"/>
+            <a:ext cx="1296000" cy="648000"/>
+          </a:xfrm>
+          <a:prstGeom prst="rect">
+            <a:avLst/>
+          </a:prstGeom>
+          <a:noFill/>
+          <a:ln w="9525">
+            <a:noFill/>
+          </a:ln>
+        </p:spPr>
+        <p:style>
+          <a:lnRef idx="2">
+            <a:schemeClr val="accent1">
+              <a:shade val="50000"/>
+            </a:schemeClr>
+          </a:lnRef>
+          <a:fillRef idx="1">
+            <a:schemeClr val="accent1"/>
+          </a:fillRef>
+          <a:effectRef idx="0">
+            <a:schemeClr val="accent1"/>
+          </a:effectRef>
+          <a:fontRef idx="minor">
+            <a:schemeClr val="lt1"/>
+          </a:fontRef>
+        </p:style>
+        <p:txBody>
+          <a:bodyPr rtlCol="0" anchor="ctr"/>
+          <a:lstStyle/>
+          <a:p>
+            <a:pPr algn="r"/>
+            <a:r>
+              <a:rPr lang="en-AU" sz="1200" dirty="0" smtClean="0">
+                <a:solidFill>
+                  <a:sysClr val="windowText" lastClr="000000"/>
+                </a:solidFill>
+              </a:rPr>
+              <a:t>Round-trip time</a:t>
+            </a:r>
+          </a:p>
+          <a:p>
+            <a:pPr algn="r"/>
+            <a:r>
+              <a:rPr lang="en-AU" sz="1200" dirty="0" smtClean="0">
+                <a:solidFill>
+                  <a:sysClr val="windowText" lastClr="000000"/>
+                </a:solidFill>
+              </a:rPr>
+              <a:t>0.81</a:t>
+            </a:r>
+            <a:r>
+              <a:rPr lang="en-AU" sz="1200" dirty="0" smtClean="0">
+                <a:solidFill>
+                  <a:sysClr val="windowText" lastClr="000000"/>
+                </a:solidFill>
+              </a:rPr>
+              <a:t> </a:t>
+            </a:r>
+            <a:r>
+              <a:rPr lang="en-AU" sz="1200" dirty="0" err="1" smtClean="0">
+                <a:solidFill>
+                  <a:sysClr val="windowText" lastClr="000000"/>
+                </a:solidFill>
+              </a:rPr>
+              <a:t>ms</a:t>
+            </a:r>
+            <a:endParaRPr lang="en-AU" sz="1200" dirty="0">
+              <a:solidFill>
+                <a:sysClr val="windowText" lastClr="000000"/>
+              </a:solidFill>
+            </a:endParaRPr>
+          </a:p>
+        </p:txBody>
+      </p:sp>
+    </p:spTree>
+    <p:extLst>
+      <p:ext uri="{BB962C8B-B14F-4D97-AF65-F5344CB8AC3E}">
+        <p14:creationId xmlns:p14="http://schemas.microsoft.com/office/powerpoint/2010/main" val="2877780064"/>
       </p:ext>
     </p:extLst>
   </p:cSld>

</xml_diff>